<commit_message>
Update Data Structure & Algorithms.pptx
</commit_message>
<xml_diff>
--- a/algorithms/slides/Data Structure & Algorithms.pptx
+++ b/algorithms/slides/Data Structure & Algorithms.pptx
@@ -5,10 +5,10 @@
     <p:sldMasterId id="2147483648" r:id="rId1"/>
   </p:sldMasterIdLst>
   <p:notesMasterIdLst>
-    <p:notesMasterId r:id="rId10"/>
+    <p:notesMasterId r:id="rId11"/>
   </p:notesMasterIdLst>
   <p:handoutMasterIdLst>
-    <p:handoutMasterId r:id="rId11"/>
+    <p:handoutMasterId r:id="rId12"/>
   </p:handoutMasterIdLst>
   <p:sldIdLst>
     <p:sldId id="257" r:id="rId2"/>
@@ -18,7 +18,8 @@
     <p:sldId id="273" r:id="rId6"/>
     <p:sldId id="274" r:id="rId7"/>
     <p:sldId id="275" r:id="rId8"/>
-    <p:sldId id="269" r:id="rId9"/>
+    <p:sldId id="276" r:id="rId9"/>
+    <p:sldId id="269" r:id="rId10"/>
   </p:sldIdLst>
   <p:sldSz cx="12192000" cy="6858000"/>
   <p:notesSz cx="6858000" cy="9144000"/>
@@ -222,7 +223,7 @@
           <a:p>
             <a:fld id="{19232A22-B755-4049-8957-D7C187C66F42}" type="datetimeFigureOut">
               <a:rPr lang="en-IN" smtClean="0"/>
-              <a:t>05-05-2023</a:t>
+              <a:t>06-05-2023</a:t>
             </a:fld>
             <a:endParaRPr lang="en-IN"/>
           </a:p>
@@ -399,7 +400,7 @@
           <a:p>
             <a:fld id="{96EA4C85-C6C9-4BDB-8976-14D135ADECDA}" type="datetimeFigureOut">
               <a:rPr lang="en-IN" smtClean="0"/>
-              <a:t>05-05-2023</a:t>
+              <a:t>06-05-2023</a:t>
             </a:fld>
             <a:endParaRPr lang="en-IN"/>
           </a:p>
@@ -5708,7 +5709,7 @@
         <p:spPr>
           <a:xfrm>
             <a:off x="692150" y="1514376"/>
-            <a:ext cx="10814050" cy="1200288"/>
+            <a:ext cx="10814050" cy="2677616"/>
           </a:xfrm>
           <a:prstGeom prst="rect">
             <a:avLst/>
@@ -5738,6 +5739,68 @@
               </a:rPr>
               <a:t>Asymptotic analysis of an algorithm refers to defining the mathematical foundation of its run-time performance. Using the asymptotic analysis, we can very well conclude the best case, average case and worst case scenario of an algorithm.</a:t>
             </a:r>
+          </a:p>
+          <a:p>
+            <a:pPr>
+              <a:lnSpc>
+                <a:spcPct val="150000"/>
+              </a:lnSpc>
+            </a:pPr>
+            <a:endParaRPr lang="en-GB" sz="1600" dirty="0">
+              <a:latin typeface="Open Sans" panose="020B0606030504020204" pitchFamily="34" charset="0"/>
+              <a:ea typeface="Open Sans" panose="020B0606030504020204" pitchFamily="34" charset="0"/>
+              <a:cs typeface="Open Sans" panose="020B0606030504020204" pitchFamily="34" charset="0"/>
+            </a:endParaRPr>
+          </a:p>
+          <a:p>
+            <a:pPr>
+              <a:lnSpc>
+                <a:spcPct val="150000"/>
+              </a:lnSpc>
+            </a:pPr>
+            <a:r>
+              <a:rPr lang="en-GB" sz="1600" dirty="0">
+                <a:effectLst/>
+                <a:latin typeface="Open Sans" panose="020B0606030504020204" pitchFamily="34" charset="0"/>
+                <a:ea typeface="Open Sans" panose="020B0606030504020204" pitchFamily="34" charset="0"/>
+                <a:cs typeface="Open Sans" panose="020B0606030504020204" pitchFamily="34" charset="0"/>
+              </a:rPr>
+              <a:t>Using asymptotic analysis we don’t measure actual running time of algorithm.</a:t>
+            </a:r>
+          </a:p>
+          <a:p>
+            <a:pPr>
+              <a:lnSpc>
+                <a:spcPct val="150000"/>
+              </a:lnSpc>
+            </a:pPr>
+            <a:endParaRPr lang="en-GB" sz="1600" dirty="0">
+              <a:effectLst/>
+              <a:latin typeface="Open Sans" panose="020B0606030504020204" pitchFamily="34" charset="0"/>
+              <a:ea typeface="Open Sans" panose="020B0606030504020204" pitchFamily="34" charset="0"/>
+              <a:cs typeface="Open Sans" panose="020B0606030504020204" pitchFamily="34" charset="0"/>
+            </a:endParaRPr>
+          </a:p>
+          <a:p>
+            <a:pPr>
+              <a:lnSpc>
+                <a:spcPct val="150000"/>
+              </a:lnSpc>
+            </a:pPr>
+            <a:r>
+              <a:rPr lang="en-GB" sz="1600" dirty="0">
+                <a:latin typeface="Open Sans" panose="020B0606030504020204" pitchFamily="34" charset="0"/>
+                <a:ea typeface="Open Sans" panose="020B0606030504020204" pitchFamily="34" charset="0"/>
+                <a:cs typeface="Open Sans" panose="020B0606030504020204" pitchFamily="34" charset="0"/>
+              </a:rPr>
+              <a:t>It helps in determining how time and space taken by algorithm increases with input size</a:t>
+            </a:r>
+            <a:endParaRPr lang="en-GB" sz="1600" dirty="0">
+              <a:effectLst/>
+              <a:latin typeface="Open Sans" panose="020B0606030504020204" pitchFamily="34" charset="0"/>
+              <a:ea typeface="Open Sans" panose="020B0606030504020204" pitchFamily="34" charset="0"/>
+              <a:cs typeface="Open Sans" panose="020B0606030504020204" pitchFamily="34" charset="0"/>
+            </a:endParaRPr>
           </a:p>
         </p:txBody>
       </p:sp>
@@ -5755,6 +5818,287 @@
 </file>
 
 <file path=ppt/slides/slide8.xml><?xml version="1.0" encoding="utf-8"?>
+<p:sld xmlns:a="http://schemas.openxmlformats.org/drawingml/2006/main" xmlns:r="http://schemas.openxmlformats.org/officeDocument/2006/relationships" xmlns:p="http://schemas.openxmlformats.org/presentationml/2006/main">
+  <p:cSld>
+    <p:spTree>
+      <p:nvGrpSpPr>
+        <p:cNvPr id="1" name=""/>
+        <p:cNvGrpSpPr/>
+        <p:nvPr/>
+      </p:nvGrpSpPr>
+      <p:grpSpPr>
+        <a:xfrm>
+          <a:off x="0" y="0"/>
+          <a:ext cx="0" cy="0"/>
+          <a:chOff x="0" y="0"/>
+          <a:chExt cx="0" cy="0"/>
+        </a:xfrm>
+      </p:grpSpPr>
+      <p:sp>
+        <p:nvSpPr>
+          <p:cNvPr id="2" name="Google Shape;656;p77">
+            <a:extLst>
+              <a:ext uri="{FF2B5EF4-FFF2-40B4-BE49-F238E27FC236}">
+                <a16:creationId xmlns:a16="http://schemas.microsoft.com/office/drawing/2014/main" id="{AFA70A70-8598-E7D5-5735-0226644C3173}"/>
+              </a:ext>
+            </a:extLst>
+          </p:cNvPr>
+          <p:cNvSpPr txBox="1"/>
+          <p:nvPr/>
+        </p:nvSpPr>
+        <p:spPr>
+          <a:xfrm>
+            <a:off x="692150" y="452918"/>
+            <a:ext cx="10814050" cy="707886"/>
+          </a:xfrm>
+          <a:prstGeom prst="rect">
+            <a:avLst/>
+          </a:prstGeom>
+          <a:noFill/>
+          <a:ln>
+            <a:noFill/>
+          </a:ln>
+        </p:spPr>
+        <p:txBody>
+          <a:bodyPr spcFirstLastPara="1" wrap="square" lIns="91425" tIns="45700" rIns="91425" bIns="45700" anchor="t" anchorCtr="0">
+            <a:noAutofit/>
+          </a:bodyPr>
+          <a:lstStyle/>
+          <a:p>
+            <a:pPr marL="0" marR="0" lvl="0" indent="0" algn="l" rtl="0">
+              <a:spcBef>
+                <a:spcPts val="0"/>
+              </a:spcBef>
+              <a:spcAft>
+                <a:spcPts val="0"/>
+              </a:spcAft>
+              <a:buNone/>
+            </a:pPr>
+            <a:r>
+              <a:rPr lang="en-IN" sz="4000" b="1" dirty="0">
+                <a:solidFill>
+                  <a:schemeClr val="accent1"/>
+                </a:solidFill>
+                <a:latin typeface="Open Sans"/>
+                <a:ea typeface="Open Sans"/>
+                <a:cs typeface="Open Sans"/>
+                <a:sym typeface="Open Sans"/>
+              </a:rPr>
+              <a:t>Asymptotic Notations</a:t>
+            </a:r>
+            <a:endParaRPr sz="4000" b="1" dirty="0">
+              <a:solidFill>
+                <a:schemeClr val="accent1"/>
+              </a:solidFill>
+              <a:latin typeface="Open Sans"/>
+              <a:ea typeface="Open Sans"/>
+              <a:cs typeface="Open Sans"/>
+              <a:sym typeface="Open Sans"/>
+            </a:endParaRPr>
+          </a:p>
+        </p:txBody>
+      </p:sp>
+      <p:sp>
+        <p:nvSpPr>
+          <p:cNvPr id="3" name="Google Shape;658;p77">
+            <a:extLst>
+              <a:ext uri="{FF2B5EF4-FFF2-40B4-BE49-F238E27FC236}">
+                <a16:creationId xmlns:a16="http://schemas.microsoft.com/office/drawing/2014/main" id="{23F8CA33-974D-A71D-AEB7-0DDBFA222275}"/>
+              </a:ext>
+            </a:extLst>
+          </p:cNvPr>
+          <p:cNvSpPr>
+            <a:spLocks/>
+          </p:cNvSpPr>
+          <p:nvPr/>
+        </p:nvSpPr>
+        <p:spPr>
+          <a:xfrm>
+            <a:off x="692150" y="1514376"/>
+            <a:ext cx="10814050" cy="3046948"/>
+          </a:xfrm>
+          <a:prstGeom prst="rect">
+            <a:avLst/>
+          </a:prstGeom>
+          <a:noFill/>
+          <a:ln>
+            <a:noFill/>
+          </a:ln>
+        </p:spPr>
+        <p:txBody>
+          <a:bodyPr spcFirstLastPara="1" wrap="square" lIns="91425" tIns="45700" rIns="91425" bIns="45700" anchor="t" anchorCtr="0">
+            <a:spAutoFit/>
+          </a:bodyPr>
+          <a:lstStyle/>
+          <a:p>
+            <a:pPr>
+              <a:lnSpc>
+                <a:spcPct val="150000"/>
+              </a:lnSpc>
+            </a:pPr>
+            <a:r>
+              <a:rPr lang="en-GB" sz="1600" dirty="0">
+                <a:effectLst/>
+                <a:latin typeface="Open Sans" panose="020B0606030504020204" pitchFamily="34" charset="0"/>
+                <a:ea typeface="Open Sans" panose="020B0606030504020204" pitchFamily="34" charset="0"/>
+                <a:cs typeface="Open Sans" panose="020B0606030504020204" pitchFamily="34" charset="0"/>
+              </a:rPr>
+              <a:t>Asymptotic notations are the mathematical tools used to describe the running time of an algorithm in terms of input size .</a:t>
+            </a:r>
+          </a:p>
+          <a:p>
+            <a:pPr>
+              <a:lnSpc>
+                <a:spcPct val="150000"/>
+              </a:lnSpc>
+            </a:pPr>
+            <a:endParaRPr lang="en-GB" sz="1600" dirty="0">
+              <a:latin typeface="Open Sans" panose="020B0606030504020204" pitchFamily="34" charset="0"/>
+              <a:ea typeface="Open Sans" panose="020B0606030504020204" pitchFamily="34" charset="0"/>
+              <a:cs typeface="Open Sans" panose="020B0606030504020204" pitchFamily="34" charset="0"/>
+            </a:endParaRPr>
+          </a:p>
+          <a:p>
+            <a:pPr>
+              <a:lnSpc>
+                <a:spcPct val="150000"/>
+              </a:lnSpc>
+            </a:pPr>
+            <a:r>
+              <a:rPr lang="en-GB" sz="1600" dirty="0">
+                <a:effectLst/>
+                <a:latin typeface="Open Sans" panose="020B0606030504020204" pitchFamily="34" charset="0"/>
+                <a:ea typeface="Open Sans" panose="020B0606030504020204" pitchFamily="34" charset="0"/>
+                <a:cs typeface="Open Sans" panose="020B0606030504020204" pitchFamily="34" charset="0"/>
+              </a:rPr>
+              <a:t>Asymptotic notations help us in determining </a:t>
+            </a:r>
+          </a:p>
+          <a:p>
+            <a:pPr marL="285750" indent="-285750">
+              <a:lnSpc>
+                <a:spcPct val="150000"/>
+              </a:lnSpc>
+              <a:buFont typeface="Wingdings" panose="05000000000000000000" pitchFamily="2" charset="2"/>
+              <a:buChar char="§"/>
+            </a:pPr>
+            <a:r>
+              <a:rPr lang="en-GB" sz="1600" dirty="0">
+                <a:latin typeface="Open Sans" panose="020B0606030504020204" pitchFamily="34" charset="0"/>
+                <a:ea typeface="Open Sans" panose="020B0606030504020204" pitchFamily="34" charset="0"/>
+                <a:cs typeface="Open Sans" panose="020B0606030504020204" pitchFamily="34" charset="0"/>
+              </a:rPr>
+              <a:t>Best case – Omega </a:t>
+            </a:r>
+            <a:r>
+              <a:rPr lang="el-GR" sz="1600" dirty="0">
+                <a:latin typeface="Open Sans" panose="020B0606030504020204" pitchFamily="34" charset="0"/>
+                <a:ea typeface="Open Sans" panose="020B0606030504020204" pitchFamily="34" charset="0"/>
+                <a:cs typeface="Open Sans" panose="020B0606030504020204" pitchFamily="34" charset="0"/>
+              </a:rPr>
+              <a:t>Ω</a:t>
+            </a:r>
+            <a:r>
+              <a:rPr lang="en-GB" sz="1600" dirty="0">
+                <a:latin typeface="Open Sans" panose="020B0606030504020204" pitchFamily="34" charset="0"/>
+                <a:ea typeface="Open Sans" panose="020B0606030504020204" pitchFamily="34" charset="0"/>
+                <a:cs typeface="Open Sans" panose="020B0606030504020204" pitchFamily="34" charset="0"/>
+              </a:rPr>
+              <a:t>, lower bound of algorithm’s running time, </a:t>
+            </a:r>
+            <a:r>
+              <a:rPr lang="en-GB" sz="1600" dirty="0" err="1">
+                <a:latin typeface="Open Sans" panose="020B0606030504020204" pitchFamily="34" charset="0"/>
+                <a:ea typeface="Open Sans" panose="020B0606030504020204" pitchFamily="34" charset="0"/>
+                <a:cs typeface="Open Sans" panose="020B0606030504020204" pitchFamily="34" charset="0"/>
+              </a:rPr>
+              <a:t>i.e</a:t>
+            </a:r>
+            <a:r>
+              <a:rPr lang="en-GB" sz="1600" dirty="0">
+                <a:latin typeface="Open Sans" panose="020B0606030504020204" pitchFamily="34" charset="0"/>
+                <a:ea typeface="Open Sans" panose="020B0606030504020204" pitchFamily="34" charset="0"/>
+                <a:cs typeface="Open Sans" panose="020B0606030504020204" pitchFamily="34" charset="0"/>
+              </a:rPr>
+              <a:t> best amount of time an algorithm can take to complete</a:t>
+            </a:r>
+          </a:p>
+          <a:p>
+            <a:pPr marL="285750" indent="-285750">
+              <a:lnSpc>
+                <a:spcPct val="150000"/>
+              </a:lnSpc>
+              <a:buFont typeface="Wingdings" panose="05000000000000000000" pitchFamily="2" charset="2"/>
+              <a:buChar char="§"/>
+            </a:pPr>
+            <a:r>
+              <a:rPr lang="en-GB" sz="1600" dirty="0">
+                <a:latin typeface="Open Sans" panose="020B0606030504020204" pitchFamily="34" charset="0"/>
+                <a:ea typeface="Open Sans" panose="020B0606030504020204" pitchFamily="34" charset="0"/>
+                <a:cs typeface="Open Sans" panose="020B0606030504020204" pitchFamily="34" charset="0"/>
+              </a:rPr>
+              <a:t>Average case – </a:t>
+            </a:r>
+            <a:r>
+              <a:rPr lang="en-GB" sz="1600">
+                <a:latin typeface="Open Sans" panose="020B0606030504020204" pitchFamily="34" charset="0"/>
+                <a:ea typeface="Open Sans" panose="020B0606030504020204" pitchFamily="34" charset="0"/>
+                <a:cs typeface="Open Sans" panose="020B0606030504020204" pitchFamily="34" charset="0"/>
+              </a:rPr>
+              <a:t>Big O, </a:t>
+            </a:r>
+            <a:endParaRPr lang="en-GB" sz="1600" dirty="0">
+              <a:latin typeface="Open Sans" panose="020B0606030504020204" pitchFamily="34" charset="0"/>
+              <a:ea typeface="Open Sans" panose="020B0606030504020204" pitchFamily="34" charset="0"/>
+              <a:cs typeface="Open Sans" panose="020B0606030504020204" pitchFamily="34" charset="0"/>
+            </a:endParaRPr>
+          </a:p>
+          <a:p>
+            <a:pPr marL="285750" indent="-285750">
+              <a:lnSpc>
+                <a:spcPct val="150000"/>
+              </a:lnSpc>
+              <a:buFont typeface="Wingdings" panose="05000000000000000000" pitchFamily="2" charset="2"/>
+              <a:buChar char="§"/>
+            </a:pPr>
+            <a:r>
+              <a:rPr lang="en-GB" sz="1600" dirty="0">
+                <a:latin typeface="Open Sans" panose="020B0606030504020204" pitchFamily="34" charset="0"/>
+                <a:ea typeface="Open Sans" panose="020B0606030504020204" pitchFamily="34" charset="0"/>
+                <a:cs typeface="Open Sans" panose="020B0606030504020204" pitchFamily="34" charset="0"/>
+              </a:rPr>
+              <a:t>Worst case – Theta </a:t>
+            </a:r>
+            <a:r>
+              <a:rPr lang="el-GR" sz="1600" dirty="0">
+                <a:latin typeface="Open Sans" panose="020B0606030504020204" pitchFamily="34" charset="0"/>
+                <a:ea typeface="Open Sans" panose="020B0606030504020204" pitchFamily="34" charset="0"/>
+                <a:cs typeface="Open Sans" panose="020B0606030504020204" pitchFamily="34" charset="0"/>
+              </a:rPr>
+              <a:t>Θ</a:t>
+            </a:r>
+            <a:endParaRPr lang="en-GB" sz="1600" dirty="0">
+              <a:latin typeface="Open Sans" panose="020B0606030504020204" pitchFamily="34" charset="0"/>
+              <a:ea typeface="Open Sans" panose="020B0606030504020204" pitchFamily="34" charset="0"/>
+              <a:cs typeface="Open Sans" panose="020B0606030504020204" pitchFamily="34" charset="0"/>
+            </a:endParaRPr>
+          </a:p>
+        </p:txBody>
+      </p:sp>
+    </p:spTree>
+    <p:extLst>
+      <p:ext uri="{BB962C8B-B14F-4D97-AF65-F5344CB8AC3E}">
+        <p14:creationId xmlns:p14="http://schemas.microsoft.com/office/powerpoint/2010/main" val="2213658506"/>
+      </p:ext>
+    </p:extLst>
+  </p:cSld>
+  <p:clrMapOvr>
+    <a:masterClrMapping/>
+  </p:clrMapOvr>
+</p:sld>
+</file>
+
+<file path=ppt/slides/slide9.xml><?xml version="1.0" encoding="utf-8"?>
 <p:sld xmlns:a="http://schemas.openxmlformats.org/drawingml/2006/main" xmlns:r="http://schemas.openxmlformats.org/officeDocument/2006/relationships" xmlns:p="http://schemas.openxmlformats.org/presentationml/2006/main">
   <p:cSld>
     <p:spTree>

</xml_diff>